<commit_message>
20200621: 1. Second Week Update
</commit_message>
<xml_diff>
--- a/FromEmbeddingToLM.pptx
+++ b/FromEmbeddingToLM.pptx
@@ -35,11 +35,14 @@
     <p:sldId id="290" r:id="rId29"/>
     <p:sldId id="291" r:id="rId30"/>
     <p:sldId id="292" r:id="rId31"/>
-    <p:sldId id="263" r:id="rId32"/>
-    <p:sldId id="268" r:id="rId33"/>
-    <p:sldId id="266" r:id="rId34"/>
-    <p:sldId id="267" r:id="rId35"/>
-    <p:sldId id="280" r:id="rId36"/>
+    <p:sldId id="294" r:id="rId32"/>
+    <p:sldId id="295" r:id="rId33"/>
+    <p:sldId id="296" r:id="rId34"/>
+    <p:sldId id="263" r:id="rId35"/>
+    <p:sldId id="268" r:id="rId36"/>
+    <p:sldId id="266" r:id="rId37"/>
+    <p:sldId id="267" r:id="rId38"/>
+    <p:sldId id="280" r:id="rId39"/>
   </p:sldIdLst>
   <p:sldSz cx="12192000" cy="6858000"/>
   <p:notesSz cx="6858000" cy="9144000"/>
@@ -277,7 +280,7 @@
           <a:p>
             <a:fld id="{483FC479-F0E8-42DC-BB73-6E9DB9636FC7}" type="datetimeFigureOut">
               <a:rPr lang="zh-TW" altLang="en-US" smtClean="0"/>
-              <a:t>2020/6/14</a:t>
+              <a:t>2020/6/21</a:t>
             </a:fld>
             <a:endParaRPr lang="zh-TW" altLang="en-US"/>
           </a:p>
@@ -447,7 +450,7 @@
           <a:p>
             <a:fld id="{483FC479-F0E8-42DC-BB73-6E9DB9636FC7}" type="datetimeFigureOut">
               <a:rPr lang="zh-TW" altLang="en-US" smtClean="0"/>
-              <a:t>2020/6/14</a:t>
+              <a:t>2020/6/21</a:t>
             </a:fld>
             <a:endParaRPr lang="zh-TW" altLang="en-US"/>
           </a:p>
@@ -627,7 +630,7 @@
           <a:p>
             <a:fld id="{483FC479-F0E8-42DC-BB73-6E9DB9636FC7}" type="datetimeFigureOut">
               <a:rPr lang="zh-TW" altLang="en-US" smtClean="0"/>
-              <a:t>2020/6/14</a:t>
+              <a:t>2020/6/21</a:t>
             </a:fld>
             <a:endParaRPr lang="zh-TW" altLang="en-US"/>
           </a:p>
@@ -797,7 +800,7 @@
           <a:p>
             <a:fld id="{483FC479-F0E8-42DC-BB73-6E9DB9636FC7}" type="datetimeFigureOut">
               <a:rPr lang="zh-TW" altLang="en-US" smtClean="0"/>
-              <a:t>2020/6/14</a:t>
+              <a:t>2020/6/21</a:t>
             </a:fld>
             <a:endParaRPr lang="zh-TW" altLang="en-US"/>
           </a:p>
@@ -1043,7 +1046,7 @@
           <a:p>
             <a:fld id="{483FC479-F0E8-42DC-BB73-6E9DB9636FC7}" type="datetimeFigureOut">
               <a:rPr lang="zh-TW" altLang="en-US" smtClean="0"/>
-              <a:t>2020/6/14</a:t>
+              <a:t>2020/6/21</a:t>
             </a:fld>
             <a:endParaRPr lang="zh-TW" altLang="en-US"/>
           </a:p>
@@ -1275,7 +1278,7 @@
           <a:p>
             <a:fld id="{483FC479-F0E8-42DC-BB73-6E9DB9636FC7}" type="datetimeFigureOut">
               <a:rPr lang="zh-TW" altLang="en-US" smtClean="0"/>
-              <a:t>2020/6/14</a:t>
+              <a:t>2020/6/21</a:t>
             </a:fld>
             <a:endParaRPr lang="zh-TW" altLang="en-US"/>
           </a:p>
@@ -1642,7 +1645,7 @@
           <a:p>
             <a:fld id="{483FC479-F0E8-42DC-BB73-6E9DB9636FC7}" type="datetimeFigureOut">
               <a:rPr lang="zh-TW" altLang="en-US" smtClean="0"/>
-              <a:t>2020/6/14</a:t>
+              <a:t>2020/6/21</a:t>
             </a:fld>
             <a:endParaRPr lang="zh-TW" altLang="en-US"/>
           </a:p>
@@ -1760,7 +1763,7 @@
           <a:p>
             <a:fld id="{483FC479-F0E8-42DC-BB73-6E9DB9636FC7}" type="datetimeFigureOut">
               <a:rPr lang="zh-TW" altLang="en-US" smtClean="0"/>
-              <a:t>2020/6/14</a:t>
+              <a:t>2020/6/21</a:t>
             </a:fld>
             <a:endParaRPr lang="zh-TW" altLang="en-US"/>
           </a:p>
@@ -1855,7 +1858,7 @@
           <a:p>
             <a:fld id="{483FC479-F0E8-42DC-BB73-6E9DB9636FC7}" type="datetimeFigureOut">
               <a:rPr lang="zh-TW" altLang="en-US" smtClean="0"/>
-              <a:t>2020/6/14</a:t>
+              <a:t>2020/6/21</a:t>
             </a:fld>
             <a:endParaRPr lang="zh-TW" altLang="en-US"/>
           </a:p>
@@ -2132,7 +2135,7 @@
           <a:p>
             <a:fld id="{483FC479-F0E8-42DC-BB73-6E9DB9636FC7}" type="datetimeFigureOut">
               <a:rPr lang="zh-TW" altLang="en-US" smtClean="0"/>
-              <a:t>2020/6/14</a:t>
+              <a:t>2020/6/21</a:t>
             </a:fld>
             <a:endParaRPr lang="zh-TW" altLang="en-US"/>
           </a:p>
@@ -2385,7 +2388,7 @@
           <a:p>
             <a:fld id="{483FC479-F0E8-42DC-BB73-6E9DB9636FC7}" type="datetimeFigureOut">
               <a:rPr lang="zh-TW" altLang="en-US" smtClean="0"/>
-              <a:t>2020/6/14</a:t>
+              <a:t>2020/6/21</a:t>
             </a:fld>
             <a:endParaRPr lang="zh-TW" altLang="en-US"/>
           </a:p>
@@ -2598,7 +2601,7 @@
           <a:p>
             <a:fld id="{483FC479-F0E8-42DC-BB73-6E9DB9636FC7}" type="datetimeFigureOut">
               <a:rPr lang="zh-TW" altLang="en-US" smtClean="0"/>
-              <a:t>2020/6/14</a:t>
+              <a:t>2020/6/21</a:t>
             </a:fld>
             <a:endParaRPr lang="zh-TW" altLang="en-US"/>
           </a:p>
@@ -10841,111 +10844,47 @@
             <p:ph type="title"/>
           </p:nvPr>
         </p:nvSpPr>
-        <p:spPr/>
-        <p:txBody>
-          <a:bodyPr/>
-          <a:lstStyle/>
-          <a:p>
-            <a:r>
-              <a:rPr lang="en-US" altLang="zh-TW" dirty="0" smtClean="0"/>
-              <a:t>Elmo(</a:t>
-            </a:r>
-            <a:r>
-              <a:rPr lang="en-US" altLang="zh-TW" dirty="0" err="1"/>
-              <a:t>Embeddings</a:t>
-            </a:r>
-            <a:r>
-              <a:rPr lang="en-US" altLang="zh-TW" dirty="0"/>
-              <a:t> from Language Models</a:t>
-            </a:r>
-            <a:r>
-              <a:rPr lang="en-US" altLang="zh-TW" dirty="0" smtClean="0"/>
-              <a:t>)</a:t>
-            </a:r>
-            <a:endParaRPr lang="zh-TW" altLang="en-US" dirty="0"/>
-          </a:p>
-        </p:txBody>
-      </p:sp>
-      <p:sp>
-        <p:nvSpPr>
-          <p:cNvPr id="3" name="內容版面配置區 2"/>
-          <p:cNvSpPr>
-            <a:spLocks noGrp="1"/>
-          </p:cNvSpPr>
-          <p:nvPr>
-            <p:ph idx="1"/>
-          </p:nvPr>
-        </p:nvSpPr>
-        <p:spPr/>
-        <p:txBody>
-          <a:bodyPr/>
-          <a:lstStyle/>
-          <a:p>
-            <a:r>
-              <a:rPr lang="zh-TW" altLang="en-US" dirty="0" smtClean="0">
-                <a:latin typeface="微軟正黑體" panose="020B0604030504040204" pitchFamily="34" charset="-120"/>
-                <a:ea typeface="微軟正黑體" panose="020B0604030504040204" pitchFamily="34" charset="-120"/>
-              </a:rPr>
-              <a:t>透過</a:t>
-            </a:r>
-            <a:r>
-              <a:rPr lang="en-US" altLang="zh-TW" dirty="0" smtClean="0">
-                <a:latin typeface="微軟正黑體" panose="020B0604030504040204" pitchFamily="34" charset="-120"/>
-                <a:ea typeface="微軟正黑體" panose="020B0604030504040204" pitchFamily="34" charset="-120"/>
-              </a:rPr>
-              <a:t>BILSTM</a:t>
-            </a:r>
-            <a:r>
-              <a:rPr lang="zh-TW" altLang="en-US" dirty="0" smtClean="0">
-                <a:latin typeface="微軟正黑體" panose="020B0604030504040204" pitchFamily="34" charset="-120"/>
-                <a:ea typeface="微軟正黑體" panose="020B0604030504040204" pitchFamily="34" charset="-120"/>
-              </a:rPr>
-              <a:t>作為預訓練語言模型的網絡架構，其中使用下一個字詞的預測，作為習得語言知識的預訓練任務</a:t>
-            </a:r>
-            <a:endParaRPr lang="en-US" altLang="zh-TW" dirty="0" smtClean="0">
-              <a:latin typeface="微軟正黑體" panose="020B0604030504040204" pitchFamily="34" charset="-120"/>
-              <a:ea typeface="微軟正黑體" panose="020B0604030504040204" pitchFamily="34" charset="-120"/>
-            </a:endParaRPr>
-          </a:p>
-          <a:p>
-            <a:endParaRPr lang="en-US" altLang="zh-TW" dirty="0">
-              <a:latin typeface="微軟正黑體" panose="020B0604030504040204" pitchFamily="34" charset="-120"/>
-              <a:ea typeface="微軟正黑體" panose="020B0604030504040204" pitchFamily="34" charset="-120"/>
-            </a:endParaRPr>
-          </a:p>
-          <a:p>
-            <a:r>
-              <a:rPr lang="zh-TW" altLang="en-US" dirty="0" smtClean="0">
-                <a:latin typeface="微軟正黑體" panose="020B0604030504040204" pitchFamily="34" charset="-120"/>
-                <a:ea typeface="微軟正黑體" panose="020B0604030504040204" pitchFamily="34" charset="-120"/>
-              </a:rPr>
-              <a:t>透過該項任務，可以得到</a:t>
-            </a:r>
-            <a:r>
-              <a:rPr lang="en-US" altLang="zh-TW" dirty="0" smtClean="0">
-                <a:latin typeface="微軟正黑體" panose="020B0604030504040204" pitchFamily="34" charset="-120"/>
-                <a:ea typeface="微軟正黑體" panose="020B0604030504040204" pitchFamily="34" charset="-120"/>
-              </a:rPr>
-              <a:t>Sequence</a:t>
-            </a:r>
-            <a:r>
-              <a:rPr lang="zh-TW" altLang="en-US" dirty="0" smtClean="0">
-                <a:latin typeface="微軟正黑體" panose="020B0604030504040204" pitchFamily="34" charset="-120"/>
-                <a:ea typeface="微軟正黑體" panose="020B0604030504040204" pitchFamily="34" charset="-120"/>
-              </a:rPr>
-              <a:t>層次的向量輸出，再做為其他任務的輸入</a:t>
-            </a:r>
-            <a:endParaRPr lang="zh-TW" altLang="en-US" dirty="0">
-              <a:latin typeface="微軟正黑體" panose="020B0604030504040204" pitchFamily="34" charset="-120"/>
-              <a:ea typeface="微軟正黑體" panose="020B0604030504040204" pitchFamily="34" charset="-120"/>
-            </a:endParaRPr>
+        <p:spPr>
+          <a:xfrm>
+            <a:off x="693345" y="2447422"/>
+            <a:ext cx="10515600" cy="1325563"/>
+          </a:xfrm>
+        </p:spPr>
+        <p:txBody>
+          <a:bodyPr>
+            <a:normAutofit/>
+          </a:bodyPr>
+          <a:lstStyle/>
+          <a:p>
+            <a:pPr algn="ctr"/>
+            <a:r>
+              <a:rPr lang="en-US" altLang="zh-TW" sz="7200" b="1" dirty="0" smtClean="0"/>
+              <a:t>LSTM</a:t>
+            </a:r>
+            <a:r>
+              <a:rPr lang="zh-TW" altLang="en-US" sz="7200" b="1" dirty="0" smtClean="0"/>
+              <a:t> </a:t>
+            </a:r>
+            <a:r>
+              <a:rPr lang="en-US" altLang="zh-TW" sz="7200" b="1" dirty="0" smtClean="0"/>
+              <a:t>&amp;</a:t>
+            </a:r>
+            <a:r>
+              <a:rPr lang="zh-TW" altLang="en-US" sz="7200" b="1" dirty="0" smtClean="0"/>
+              <a:t> </a:t>
+            </a:r>
+            <a:r>
+              <a:rPr lang="en-US" altLang="zh-TW" sz="7200" b="1" dirty="0" smtClean="0"/>
+              <a:t>Bi-LSTM</a:t>
+            </a:r>
+            <a:endParaRPr lang="zh-TW" altLang="en-US" sz="7200" b="1" dirty="0"/>
           </a:p>
         </p:txBody>
       </p:sp>
     </p:spTree>
     <p:extLst>
       <p:ext uri="{BB962C8B-B14F-4D97-AF65-F5344CB8AC3E}">
-        <p14:creationId xmlns:p14="http://schemas.microsoft.com/office/powerpoint/2010/main" val="2846794759"/>
+        <p14:creationId xmlns:p14="http://schemas.microsoft.com/office/powerpoint/2010/main" val="2185038982"/>
       </p:ext>
     </p:extLst>
   </p:cSld>
@@ -10989,7 +10928,7 @@
           <a:p>
             <a:r>
               <a:rPr lang="en-US" altLang="zh-TW" dirty="0" smtClean="0"/>
-              <a:t>Language Model Based Prediction</a:t>
+              <a:t>LSTM</a:t>
             </a:r>
             <a:endParaRPr lang="zh-TW" altLang="en-US" dirty="0"/>
           </a:p>
@@ -11011,18 +10950,25 @@
           <a:lstStyle/>
           <a:p>
             <a:r>
+              <a:rPr lang="zh-TW" altLang="en-US" dirty="0" smtClean="0">
+                <a:latin typeface="微軟正黑體" panose="020B0604030504040204" pitchFamily="34" charset="-120"/>
+                <a:ea typeface="微軟正黑體" panose="020B0604030504040204" pitchFamily="34" charset="-120"/>
+              </a:rPr>
+              <a:t>與</a:t>
+            </a:r>
+            <a:r>
               <a:rPr lang="en-US" altLang="zh-TW" dirty="0" smtClean="0">
                 <a:latin typeface="微軟正黑體" panose="020B0604030504040204" pitchFamily="34" charset="-120"/>
                 <a:ea typeface="微軟正黑體" panose="020B0604030504040204" pitchFamily="34" charset="-120"/>
               </a:rPr>
-              <a:t>LM</a:t>
+              <a:t>RNN</a:t>
             </a:r>
             <a:r>
               <a:rPr lang="zh-TW" altLang="en-US" dirty="0" smtClean="0">
                 <a:latin typeface="微軟正黑體" panose="020B0604030504040204" pitchFamily="34" charset="-120"/>
                 <a:ea typeface="微軟正黑體" panose="020B0604030504040204" pitchFamily="34" charset="-120"/>
               </a:rPr>
-              <a:t>的出現，主要是在於認為語言學的資訊可以透過神經網絡的學習透過數值表達出</a:t>
+              <a:t>原理相同</a:t>
             </a:r>
             <a:endParaRPr lang="en-US" altLang="zh-TW" dirty="0" smtClean="0">
               <a:latin typeface="微軟正黑體" panose="020B0604030504040204" pitchFamily="34" charset="-120"/>
@@ -11030,34 +10976,25 @@
             </a:endParaRPr>
           </a:p>
           <a:p>
-            <a:endParaRPr lang="en-US" altLang="zh-TW" dirty="0">
-              <a:latin typeface="微軟正黑體" panose="020B0604030504040204" pitchFamily="34" charset="-120"/>
-              <a:ea typeface="微軟正黑體" panose="020B0604030504040204" pitchFamily="34" charset="-120"/>
-            </a:endParaRPr>
-          </a:p>
-          <a:p>
-            <a:r>
-              <a:rPr lang="zh-TW" altLang="en-US" dirty="0" smtClean="0">
-                <a:latin typeface="微軟正黑體" panose="020B0604030504040204" pitchFamily="34" charset="-120"/>
-                <a:ea typeface="微軟正黑體" panose="020B0604030504040204" pitchFamily="34" charset="-120"/>
-              </a:rPr>
-              <a:t>透過預訓練的語言模型，所輸</a:t>
-            </a:r>
             <a:endParaRPr lang="en-US" altLang="zh-TW" dirty="0" smtClean="0">
               <a:latin typeface="微軟正黑體" panose="020B0604030504040204" pitchFamily="34" charset="-120"/>
               <a:ea typeface="微軟正黑體" panose="020B0604030504040204" pitchFamily="34" charset="-120"/>
             </a:endParaRPr>
           </a:p>
           <a:p>
-            <a:pPr marL="0" indent="0">
-              <a:buNone/>
-            </a:pPr>
             <a:r>
               <a:rPr lang="zh-TW" altLang="en-US" dirty="0" smtClean="0">
                 <a:latin typeface="微軟正黑體" panose="020B0604030504040204" pitchFamily="34" charset="-120"/>
                 <a:ea typeface="微軟正黑體" panose="020B0604030504040204" pitchFamily="34" charset="-120"/>
               </a:rPr>
-              <a:t>出的文字向量，可以作為後續任</a:t>
+              <a:t>差別在於增加一個輸送的概念</a:t>
+            </a:r>
+            <a:r>
+              <a:rPr lang="en-US" altLang="zh-TW" dirty="0" err="1" smtClean="0">
+                <a:latin typeface="微軟正黑體" panose="020B0604030504040204" pitchFamily="34" charset="-120"/>
+                <a:ea typeface="微軟正黑體" panose="020B0604030504040204" pitchFamily="34" charset="-120"/>
+              </a:rPr>
+              <a:t>ct</a:t>
             </a:r>
             <a:endParaRPr lang="en-US" altLang="zh-TW" dirty="0" smtClean="0">
               <a:latin typeface="微軟正黑體" panose="020B0604030504040204" pitchFamily="34" charset="-120"/>
@@ -11065,26 +11002,29 @@
             </a:endParaRPr>
           </a:p>
           <a:p>
-            <a:pPr marL="0" indent="0">
-              <a:buNone/>
-            </a:pPr>
-            <a:r>
-              <a:rPr lang="zh-TW" altLang="en-US" dirty="0" smtClean="0">
-                <a:latin typeface="微軟正黑體" panose="020B0604030504040204" pitchFamily="34" charset="-120"/>
-                <a:ea typeface="微軟正黑體" panose="020B0604030504040204" pitchFamily="34" charset="-120"/>
-              </a:rPr>
-              <a:t>何ＮＬＰ任務的基礎</a:t>
-            </a:r>
             <a:endParaRPr lang="en-US" altLang="zh-TW" dirty="0" smtClean="0">
               <a:latin typeface="微軟正黑體" panose="020B0604030504040204" pitchFamily="34" charset="-120"/>
               <a:ea typeface="微軟正黑體" panose="020B0604030504040204" pitchFamily="34" charset="-120"/>
             </a:endParaRPr>
           </a:p>
+          <a:p>
+            <a:r>
+              <a:rPr lang="zh-TW" altLang="en-US" dirty="0" smtClean="0">
+                <a:latin typeface="微軟正黑體" panose="020B0604030504040204" pitchFamily="34" charset="-120"/>
+                <a:ea typeface="微軟正黑體" panose="020B0604030504040204" pitchFamily="34" charset="-120"/>
+              </a:rPr>
+              <a:t>輸送帶外透過三個門，來加強過濾資訊</a:t>
+            </a:r>
+            <a:endParaRPr lang="en-US" altLang="zh-TW" dirty="0" smtClean="0">
+              <a:latin typeface="微軟正黑體" panose="020B0604030504040204" pitchFamily="34" charset="-120"/>
+              <a:ea typeface="微軟正黑體" panose="020B0604030504040204" pitchFamily="34" charset="-120"/>
+            </a:endParaRPr>
+          </a:p>
         </p:txBody>
       </p:sp>
       <p:pic>
         <p:nvPicPr>
-          <p:cNvPr id="6146" name="Picture 2" descr="LM.2 What is a language model? - YouTube"/>
+          <p:cNvPr id="1030" name="Picture 6" descr="Alt text"/>
           <p:cNvPicPr>
             <a:picLocks noChangeAspect="1" noChangeArrowheads="1"/>
           </p:cNvPicPr>
@@ -11105,8 +11045,8 @@
         </p:blipFill>
         <p:spPr bwMode="auto">
           <a:xfrm>
-            <a:off x="7171836" y="3112477"/>
-            <a:ext cx="4911968" cy="3683977"/>
+            <a:off x="7142153" y="1140438"/>
+            <a:ext cx="4738766" cy="2601056"/>
           </a:xfrm>
           <a:prstGeom prst="rect">
             <a:avLst/>
@@ -11125,7 +11065,7 @@
       </p:pic>
       <p:pic>
         <p:nvPicPr>
-          <p:cNvPr id="6150" name="Picture 6" descr="Google AI Blog: Open Sourcing BERT: State-of-the-Art Pre-training ..."/>
+          <p:cNvPr id="1036" name="Picture 12" descr="https://upload-images.jianshu.io/upload_images/3869738-cffb5541715f5574.jpg?imageMogr2/auto-orient/strip|imageView2/2/format/jpeg"/>
           <p:cNvPicPr>
             <a:picLocks noChangeAspect="1" noChangeArrowheads="1"/>
           </p:cNvPicPr>
@@ -11146,8 +11086,8 @@
         </p:blipFill>
         <p:spPr bwMode="auto">
           <a:xfrm>
-            <a:off x="108196" y="5016011"/>
-            <a:ext cx="7356848" cy="1704522"/>
+            <a:off x="6096000" y="4412174"/>
+            <a:ext cx="6060620" cy="2277063"/>
           </a:xfrm>
           <a:prstGeom prst="rect">
             <a:avLst/>
@@ -11167,7 +11107,7 @@
     </p:spTree>
     <p:extLst>
       <p:ext uri="{BB962C8B-B14F-4D97-AF65-F5344CB8AC3E}">
-        <p14:creationId xmlns:p14="http://schemas.microsoft.com/office/powerpoint/2010/main" val="3683000370"/>
+        <p14:creationId xmlns:p14="http://schemas.microsoft.com/office/powerpoint/2010/main" val="1856302931"/>
       </p:ext>
     </p:extLst>
   </p:cSld>
@@ -11211,7 +11151,7 @@
           <a:p>
             <a:r>
               <a:rPr lang="en-US" altLang="zh-TW" dirty="0" smtClean="0"/>
-              <a:t>GPT2</a:t>
+              <a:t>BI-LSTM</a:t>
             </a:r>
             <a:endParaRPr lang="zh-TW" altLang="en-US" dirty="0"/>
           </a:p>
@@ -11232,44 +11172,110 @@
           <a:bodyPr/>
           <a:lstStyle/>
           <a:p>
-            <a:endParaRPr lang="zh-TW" altLang="en-US"/>
+            <a:r>
+              <a:rPr lang="en-US" altLang="zh-TW" dirty="0" smtClean="0">
+                <a:latin typeface="微軟正黑體" panose="020B0604030504040204" pitchFamily="34" charset="-120"/>
+                <a:ea typeface="微軟正黑體" panose="020B0604030504040204" pitchFamily="34" charset="-120"/>
+              </a:rPr>
+              <a:t>LSTM</a:t>
+            </a:r>
+            <a:r>
+              <a:rPr lang="zh-TW" altLang="en-US" dirty="0" smtClean="0">
+                <a:latin typeface="微軟正黑體" panose="020B0604030504040204" pitchFamily="34" charset="-120"/>
+                <a:ea typeface="微軟正黑體" panose="020B0604030504040204" pitchFamily="34" charset="-120"/>
+              </a:rPr>
+              <a:t>的變形，雙向的</a:t>
+            </a:r>
+            <a:r>
+              <a:rPr lang="en-US" altLang="zh-TW" dirty="0" smtClean="0">
+                <a:latin typeface="微軟正黑體" panose="020B0604030504040204" pitchFamily="34" charset="-120"/>
+                <a:ea typeface="微軟正黑體" panose="020B0604030504040204" pitchFamily="34" charset="-120"/>
+              </a:rPr>
+              <a:t>LSTM</a:t>
+            </a:r>
+          </a:p>
+          <a:p>
+            <a:endParaRPr lang="en-US" altLang="zh-TW" dirty="0">
+              <a:latin typeface="微軟正黑體" panose="020B0604030504040204" pitchFamily="34" charset="-120"/>
+              <a:ea typeface="微軟正黑體" panose="020B0604030504040204" pitchFamily="34" charset="-120"/>
+            </a:endParaRPr>
+          </a:p>
+          <a:p>
+            <a:r>
+              <a:rPr lang="zh-TW" altLang="en-US" dirty="0" smtClean="0">
+                <a:latin typeface="微軟正黑體" panose="020B0604030504040204" pitchFamily="34" charset="-120"/>
+                <a:ea typeface="微軟正黑體" panose="020B0604030504040204" pitchFamily="34" charset="-120"/>
+              </a:rPr>
+              <a:t>主要為將一個</a:t>
+            </a:r>
+            <a:r>
+              <a:rPr lang="en-US" altLang="zh-TW" dirty="0" smtClean="0">
+                <a:latin typeface="微軟正黑體" panose="020B0604030504040204" pitchFamily="34" charset="-120"/>
+                <a:ea typeface="微軟正黑體" panose="020B0604030504040204" pitchFamily="34" charset="-120"/>
+              </a:rPr>
+              <a:t>sequence</a:t>
+            </a:r>
+            <a:r>
+              <a:rPr lang="zh-TW" altLang="en-US" dirty="0" smtClean="0">
+                <a:latin typeface="微軟正黑體" panose="020B0604030504040204" pitchFamily="34" charset="-120"/>
+                <a:ea typeface="微軟正黑體" panose="020B0604030504040204" pitchFamily="34" charset="-120"/>
+              </a:rPr>
+              <a:t>由前到後，</a:t>
+            </a:r>
+            <a:endParaRPr lang="en-US" altLang="zh-TW" dirty="0" smtClean="0">
+              <a:latin typeface="微軟正黑體" panose="020B0604030504040204" pitchFamily="34" charset="-120"/>
+              <a:ea typeface="微軟正黑體" panose="020B0604030504040204" pitchFamily="34" charset="-120"/>
+            </a:endParaRPr>
+          </a:p>
+          <a:p>
+            <a:pPr marL="0" indent="0">
+              <a:buNone/>
+            </a:pPr>
+            <a:r>
+              <a:rPr lang="zh-TW" altLang="en-US" dirty="0" smtClean="0">
+                <a:latin typeface="微軟正黑體" panose="020B0604030504040204" pitchFamily="34" charset="-120"/>
+                <a:ea typeface="微軟正黑體" panose="020B0604030504040204" pitchFamily="34" charset="-120"/>
+              </a:rPr>
+              <a:t>由後到前去進行訓練</a:t>
+            </a:r>
+            <a:endParaRPr lang="en-US" altLang="zh-TW" dirty="0" smtClean="0">
+              <a:latin typeface="微軟正黑體" panose="020B0604030504040204" pitchFamily="34" charset="-120"/>
+              <a:ea typeface="微軟正黑體" panose="020B0604030504040204" pitchFamily="34" charset="-120"/>
+            </a:endParaRPr>
+          </a:p>
+          <a:p>
+            <a:pPr marL="0" indent="0">
+              <a:buNone/>
+            </a:pPr>
+            <a:endParaRPr lang="en-US" altLang="zh-TW" dirty="0">
+              <a:latin typeface="微軟正黑體" panose="020B0604030504040204" pitchFamily="34" charset="-120"/>
+              <a:ea typeface="微軟正黑體" panose="020B0604030504040204" pitchFamily="34" charset="-120"/>
+            </a:endParaRPr>
+          </a:p>
+          <a:p>
+            <a:pPr marL="0" indent="0">
+              <a:buNone/>
+            </a:pPr>
+            <a:r>
+              <a:rPr lang="en-US" altLang="zh-TW" dirty="0" smtClean="0">
+                <a:latin typeface="微軟正黑體" panose="020B0604030504040204" pitchFamily="34" charset="-120"/>
+                <a:ea typeface="微軟正黑體" panose="020B0604030504040204" pitchFamily="34" charset="-120"/>
+              </a:rPr>
+              <a:t>WHY?</a:t>
+            </a:r>
           </a:p>
         </p:txBody>
       </p:sp>
       <p:pic>
         <p:nvPicPr>
-          <p:cNvPr id="4" name="圖片 3"/>
-          <p:cNvPicPr>
-            <a:picLocks noChangeAspect="1"/>
-          </p:cNvPicPr>
-          <p:nvPr/>
-        </p:nvPicPr>
-        <p:blipFill>
-          <a:blip r:embed="rId2"/>
-          <a:stretch>
-            <a:fillRect/>
-          </a:stretch>
-        </p:blipFill>
-        <p:spPr>
-          <a:xfrm>
-            <a:off x="7560391" y="2495918"/>
-            <a:ext cx="4631609" cy="4362082"/>
-          </a:xfrm>
-          <a:prstGeom prst="rect">
-            <a:avLst/>
-          </a:prstGeom>
-        </p:spPr>
-      </p:pic>
-      <p:pic>
-        <p:nvPicPr>
-          <p:cNvPr id="4104" name="Picture 8" descr="GPT及GPT-2论文笔记– 蓝林鸟的博客"/>
+          <p:cNvPr id="2050" name="Picture 2" descr="https://pic2.zhimg.com/80/v2-bf3038dca90a59eb042ea767f684ed29_720w.jpg"/>
           <p:cNvPicPr>
             <a:picLocks noChangeAspect="1" noChangeArrowheads="1"/>
           </p:cNvPicPr>
           <p:nvPr/>
         </p:nvPicPr>
         <p:blipFill>
-          <a:blip r:embed="rId3">
+          <a:blip r:embed="rId2">
             <a:extLst>
               <a:ext uri="{28A0092B-C50C-407E-A947-70E740481C1C}">
                 <a14:useLocalDpi xmlns:a14="http://schemas.microsoft.com/office/drawing/2010/main" val="0"/>
@@ -11283,8 +11289,8 @@
         </p:blipFill>
         <p:spPr bwMode="auto">
           <a:xfrm>
-            <a:off x="298897" y="2989385"/>
-            <a:ext cx="7261494" cy="3717559"/>
+            <a:off x="6096000" y="3261946"/>
+            <a:ext cx="5432628" cy="3387848"/>
           </a:xfrm>
           <a:prstGeom prst="rect">
             <a:avLst/>
@@ -11301,10 +11307,72 @@
           </a:extLst>
         </p:spPr>
       </p:pic>
+      <p:cxnSp>
+        <p:nvCxnSpPr>
+          <p:cNvPr id="5" name="直線接點 4"/>
+          <p:cNvCxnSpPr/>
+          <p:nvPr/>
+        </p:nvCxnSpPr>
+        <p:spPr>
+          <a:xfrm>
+            <a:off x="8695592" y="4484077"/>
+            <a:ext cx="228600" cy="237392"/>
+          </a:xfrm>
+          <a:prstGeom prst="line">
+            <a:avLst/>
+          </a:prstGeom>
+          <a:ln w="38100"/>
+        </p:spPr>
+        <p:style>
+          <a:lnRef idx="1">
+            <a:schemeClr val="accent2"/>
+          </a:lnRef>
+          <a:fillRef idx="0">
+            <a:schemeClr val="accent2"/>
+          </a:fillRef>
+          <a:effectRef idx="0">
+            <a:schemeClr val="accent2"/>
+          </a:effectRef>
+          <a:fontRef idx="minor">
+            <a:schemeClr val="tx1"/>
+          </a:fontRef>
+        </p:style>
+      </p:cxnSp>
+      <p:cxnSp>
+        <p:nvCxnSpPr>
+          <p:cNvPr id="9" name="直線接點 8"/>
+          <p:cNvCxnSpPr/>
+          <p:nvPr/>
+        </p:nvCxnSpPr>
+        <p:spPr>
+          <a:xfrm flipH="1">
+            <a:off x="8712669" y="4484077"/>
+            <a:ext cx="208084" cy="237392"/>
+          </a:xfrm>
+          <a:prstGeom prst="line">
+            <a:avLst/>
+          </a:prstGeom>
+          <a:ln w="38100"/>
+        </p:spPr>
+        <p:style>
+          <a:lnRef idx="1">
+            <a:schemeClr val="accent2"/>
+          </a:lnRef>
+          <a:fillRef idx="0">
+            <a:schemeClr val="accent2"/>
+          </a:fillRef>
+          <a:effectRef idx="0">
+            <a:schemeClr val="accent2"/>
+          </a:effectRef>
+          <a:fontRef idx="minor">
+            <a:schemeClr val="tx1"/>
+          </a:fontRef>
+        </p:style>
+      </p:cxnSp>
     </p:spTree>
     <p:extLst>
       <p:ext uri="{BB962C8B-B14F-4D97-AF65-F5344CB8AC3E}">
-        <p14:creationId xmlns:p14="http://schemas.microsoft.com/office/powerpoint/2010/main" val="155559941"/>
+        <p14:creationId xmlns:p14="http://schemas.microsoft.com/office/powerpoint/2010/main" val="849844021"/>
       </p:ext>
     </p:extLst>
   </p:cSld>
@@ -11348,6 +11416,630 @@
           <a:p>
             <a:r>
               <a:rPr lang="en-US" altLang="zh-TW" dirty="0" smtClean="0"/>
+              <a:t>Elmo(</a:t>
+            </a:r>
+            <a:r>
+              <a:rPr lang="en-US" altLang="zh-TW" dirty="0" err="1"/>
+              <a:t>Embeddings</a:t>
+            </a:r>
+            <a:r>
+              <a:rPr lang="en-US" altLang="zh-TW" dirty="0"/>
+              <a:t> from Language Models</a:t>
+            </a:r>
+            <a:r>
+              <a:rPr lang="en-US" altLang="zh-TW" dirty="0" smtClean="0"/>
+              <a:t>)</a:t>
+            </a:r>
+            <a:endParaRPr lang="zh-TW" altLang="en-US" dirty="0"/>
+          </a:p>
+        </p:txBody>
+      </p:sp>
+      <p:sp>
+        <p:nvSpPr>
+          <p:cNvPr id="3" name="內容版面配置區 2"/>
+          <p:cNvSpPr>
+            <a:spLocks noGrp="1"/>
+          </p:cNvSpPr>
+          <p:nvPr>
+            <p:ph idx="1"/>
+          </p:nvPr>
+        </p:nvSpPr>
+        <p:spPr/>
+        <p:txBody>
+          <a:bodyPr/>
+          <a:lstStyle/>
+          <a:p>
+            <a:r>
+              <a:rPr lang="zh-TW" altLang="en-US" dirty="0" smtClean="0">
+                <a:latin typeface="微軟正黑體" panose="020B0604030504040204" pitchFamily="34" charset="-120"/>
+                <a:ea typeface="微軟正黑體" panose="020B0604030504040204" pitchFamily="34" charset="-120"/>
+              </a:rPr>
+              <a:t>透過</a:t>
+            </a:r>
+            <a:r>
+              <a:rPr lang="en-US" altLang="zh-TW" dirty="0" smtClean="0">
+                <a:latin typeface="微軟正黑體" panose="020B0604030504040204" pitchFamily="34" charset="-120"/>
+                <a:ea typeface="微軟正黑體" panose="020B0604030504040204" pitchFamily="34" charset="-120"/>
+              </a:rPr>
+              <a:t>BILSTM</a:t>
+            </a:r>
+            <a:r>
+              <a:rPr lang="zh-TW" altLang="en-US" dirty="0" smtClean="0">
+                <a:latin typeface="微軟正黑體" panose="020B0604030504040204" pitchFamily="34" charset="-120"/>
+                <a:ea typeface="微軟正黑體" panose="020B0604030504040204" pitchFamily="34" charset="-120"/>
+              </a:rPr>
+              <a:t>作為預訓練語言模型的網絡架構，其中使用下一個字詞的預測，作為習得語言知識的預訓練任務</a:t>
+            </a:r>
+            <a:endParaRPr lang="en-US" altLang="zh-TW" dirty="0" smtClean="0">
+              <a:latin typeface="微軟正黑體" panose="020B0604030504040204" pitchFamily="34" charset="-120"/>
+              <a:ea typeface="微軟正黑體" panose="020B0604030504040204" pitchFamily="34" charset="-120"/>
+            </a:endParaRPr>
+          </a:p>
+          <a:p>
+            <a:endParaRPr lang="en-US" altLang="zh-TW" dirty="0">
+              <a:latin typeface="微軟正黑體" panose="020B0604030504040204" pitchFamily="34" charset="-120"/>
+              <a:ea typeface="微軟正黑體" panose="020B0604030504040204" pitchFamily="34" charset="-120"/>
+            </a:endParaRPr>
+          </a:p>
+          <a:p>
+            <a:r>
+              <a:rPr lang="zh-TW" altLang="en-US" dirty="0" smtClean="0">
+                <a:latin typeface="微軟正黑體" panose="020B0604030504040204" pitchFamily="34" charset="-120"/>
+                <a:ea typeface="微軟正黑體" panose="020B0604030504040204" pitchFamily="34" charset="-120"/>
+              </a:rPr>
+              <a:t>透過該項</a:t>
+            </a:r>
+            <a:r>
+              <a:rPr lang="zh-TW" altLang="en-US" dirty="0" smtClean="0">
+                <a:latin typeface="微軟正黑體" panose="020B0604030504040204" pitchFamily="34" charset="-120"/>
+                <a:ea typeface="微軟正黑體" panose="020B0604030504040204" pitchFamily="34" charset="-120"/>
+              </a:rPr>
+              <a:t>任務，可以將</a:t>
+            </a:r>
+            <a:r>
+              <a:rPr lang="en-US" altLang="zh-TW" dirty="0" smtClean="0">
+                <a:latin typeface="微軟正黑體" panose="020B0604030504040204" pitchFamily="34" charset="-120"/>
+                <a:ea typeface="微軟正黑體" panose="020B0604030504040204" pitchFamily="34" charset="-120"/>
+              </a:rPr>
+              <a:t>BILSTM</a:t>
+            </a:r>
+            <a:r>
+              <a:rPr lang="zh-TW" altLang="en-US" dirty="0" smtClean="0">
+                <a:latin typeface="微軟正黑體" panose="020B0604030504040204" pitchFamily="34" charset="-120"/>
+                <a:ea typeface="微軟正黑體" panose="020B0604030504040204" pitchFamily="34" charset="-120"/>
+              </a:rPr>
+              <a:t>的</a:t>
+            </a:r>
+            <a:r>
+              <a:rPr lang="en-US" altLang="zh-TW" dirty="0" smtClean="0">
+                <a:latin typeface="微軟正黑體" panose="020B0604030504040204" pitchFamily="34" charset="-120"/>
+                <a:ea typeface="微軟正黑體" panose="020B0604030504040204" pitchFamily="34" charset="-120"/>
+              </a:rPr>
+              <a:t>hidden layer</a:t>
+            </a:r>
+            <a:r>
+              <a:rPr lang="zh-TW" altLang="en-US" dirty="0" smtClean="0">
+                <a:latin typeface="微軟正黑體" panose="020B0604030504040204" pitchFamily="34" charset="-120"/>
+                <a:ea typeface="微軟正黑體" panose="020B0604030504040204" pitchFamily="34" charset="-120"/>
+              </a:rPr>
+              <a:t>作為</a:t>
+            </a:r>
+            <a:r>
+              <a:rPr lang="en-US" altLang="zh-TW" dirty="0" smtClean="0">
+                <a:latin typeface="微軟正黑體" panose="020B0604030504040204" pitchFamily="34" charset="-120"/>
+                <a:ea typeface="微軟正黑體" panose="020B0604030504040204" pitchFamily="34" charset="-120"/>
+              </a:rPr>
+              <a:t>embedding</a:t>
+            </a:r>
+            <a:r>
+              <a:rPr lang="zh-TW" altLang="en-US" dirty="0" smtClean="0">
+                <a:latin typeface="微軟正黑體" panose="020B0604030504040204" pitchFamily="34" charset="-120"/>
+                <a:ea typeface="微軟正黑體" panose="020B0604030504040204" pitchFamily="34" charset="-120"/>
+              </a:rPr>
+              <a:t>，</a:t>
+            </a:r>
+            <a:r>
+              <a:rPr lang="zh-TW" altLang="en-US" dirty="0" smtClean="0">
+                <a:latin typeface="微軟正黑體" panose="020B0604030504040204" pitchFamily="34" charset="-120"/>
+                <a:ea typeface="微軟正黑體" panose="020B0604030504040204" pitchFamily="34" charset="-120"/>
+              </a:rPr>
+              <a:t>接</a:t>
+            </a:r>
+            <a:r>
+              <a:rPr lang="zh-TW" altLang="en-US" dirty="0">
+                <a:latin typeface="微軟正黑體" panose="020B0604030504040204" pitchFamily="34" charset="-120"/>
+                <a:ea typeface="微軟正黑體" panose="020B0604030504040204" pitchFamily="34" charset="-120"/>
+              </a:rPr>
+              <a:t>著</a:t>
+            </a:r>
+            <a:r>
+              <a:rPr lang="zh-TW" altLang="en-US" dirty="0" smtClean="0">
+                <a:latin typeface="微軟正黑體" panose="020B0604030504040204" pitchFamily="34" charset="-120"/>
+                <a:ea typeface="微軟正黑體" panose="020B0604030504040204" pitchFamily="34" charset="-120"/>
+              </a:rPr>
+              <a:t>做為</a:t>
+            </a:r>
+            <a:r>
+              <a:rPr lang="zh-TW" altLang="en-US" dirty="0" smtClean="0">
+                <a:latin typeface="微軟正黑體" panose="020B0604030504040204" pitchFamily="34" charset="-120"/>
+                <a:ea typeface="微軟正黑體" panose="020B0604030504040204" pitchFamily="34" charset="-120"/>
+              </a:rPr>
+              <a:t>其他任務的</a:t>
+            </a:r>
+            <a:r>
+              <a:rPr lang="zh-TW" altLang="en-US" dirty="0" smtClean="0">
+                <a:latin typeface="微軟正黑體" panose="020B0604030504040204" pitchFamily="34" charset="-120"/>
+                <a:ea typeface="微軟正黑體" panose="020B0604030504040204" pitchFamily="34" charset="-120"/>
+              </a:rPr>
+              <a:t>輸入</a:t>
+            </a:r>
+            <a:endParaRPr lang="en-US" altLang="zh-TW" dirty="0" smtClean="0">
+              <a:latin typeface="微軟正黑體" panose="020B0604030504040204" pitchFamily="34" charset="-120"/>
+              <a:ea typeface="微軟正黑體" panose="020B0604030504040204" pitchFamily="34" charset="-120"/>
+            </a:endParaRPr>
+          </a:p>
+          <a:p>
+            <a:endParaRPr lang="en-US" altLang="zh-TW" dirty="0">
+              <a:latin typeface="微軟正黑體" panose="020B0604030504040204" pitchFamily="34" charset="-120"/>
+              <a:ea typeface="微軟正黑體" panose="020B0604030504040204" pitchFamily="34" charset="-120"/>
+            </a:endParaRPr>
+          </a:p>
+          <a:p>
+            <a:r>
+              <a:rPr lang="zh-TW" altLang="en-US" dirty="0" smtClean="0">
+                <a:latin typeface="微軟正黑體" panose="020B0604030504040204" pitchFamily="34" charset="-120"/>
+                <a:ea typeface="微軟正黑體" panose="020B0604030504040204" pitchFamily="34" charset="-120"/>
+              </a:rPr>
+              <a:t>這概念也就如同</a:t>
+            </a:r>
+            <a:r>
+              <a:rPr lang="zh-TW" altLang="en-US" dirty="0" smtClean="0">
+                <a:latin typeface="微軟正黑體" panose="020B0604030504040204" pitchFamily="34" charset="-120"/>
+                <a:ea typeface="微軟正黑體" panose="020B0604030504040204" pitchFamily="34" charset="-120"/>
+              </a:rPr>
+              <a:t>先透過一批語料，根據其訓練任務得到關於文字、詞的相關資訊，也就是所謂的語言模型</a:t>
+            </a:r>
+            <a:r>
+              <a:rPr lang="en-US" altLang="zh-TW" dirty="0" smtClean="0">
+                <a:latin typeface="微軟正黑體" panose="020B0604030504040204" pitchFamily="34" charset="-120"/>
+                <a:ea typeface="微軟正黑體" panose="020B0604030504040204" pitchFamily="34" charset="-120"/>
+              </a:rPr>
+              <a:t>(Language Model)</a:t>
+            </a:r>
+            <a:endParaRPr lang="en-US" altLang="zh-TW" dirty="0" smtClean="0">
+              <a:latin typeface="微軟正黑體" panose="020B0604030504040204" pitchFamily="34" charset="-120"/>
+              <a:ea typeface="微軟正黑體" panose="020B0604030504040204" pitchFamily="34" charset="-120"/>
+            </a:endParaRPr>
+          </a:p>
+        </p:txBody>
+      </p:sp>
+    </p:spTree>
+    <p:extLst>
+      <p:ext uri="{BB962C8B-B14F-4D97-AF65-F5344CB8AC3E}">
+        <p14:creationId xmlns:p14="http://schemas.microsoft.com/office/powerpoint/2010/main" val="2846794759"/>
+      </p:ext>
+    </p:extLst>
+  </p:cSld>
+  <p:clrMapOvr>
+    <a:masterClrMapping/>
+  </p:clrMapOvr>
+  <p:timing>
+    <p:tnLst>
+      <p:par>
+        <p:cTn id="1" dur="indefinite" restart="never" nodeType="tmRoot"/>
+      </p:par>
+    </p:tnLst>
+  </p:timing>
+</p:sld>
+</file>
+
+<file path=ppt/slides/slide35.xml><?xml version="1.0" encoding="utf-8"?>
+<p:sld xmlns:a="http://schemas.openxmlformats.org/drawingml/2006/main" xmlns:r="http://schemas.openxmlformats.org/officeDocument/2006/relationships" xmlns:p="http://schemas.openxmlformats.org/presentationml/2006/main">
+  <p:cSld>
+    <p:spTree>
+      <p:nvGrpSpPr>
+        <p:cNvPr id="1" name=""/>
+        <p:cNvGrpSpPr/>
+        <p:nvPr/>
+      </p:nvGrpSpPr>
+      <p:grpSpPr>
+        <a:xfrm>
+          <a:off x="0" y="0"/>
+          <a:ext cx="0" cy="0"/>
+          <a:chOff x="0" y="0"/>
+          <a:chExt cx="0" cy="0"/>
+        </a:xfrm>
+      </p:grpSpPr>
+      <p:sp>
+        <p:nvSpPr>
+          <p:cNvPr id="2" name="標題 1"/>
+          <p:cNvSpPr>
+            <a:spLocks noGrp="1"/>
+          </p:cNvSpPr>
+          <p:nvPr>
+            <p:ph type="title"/>
+          </p:nvPr>
+        </p:nvSpPr>
+        <p:spPr/>
+        <p:txBody>
+          <a:bodyPr/>
+          <a:lstStyle/>
+          <a:p>
+            <a:r>
+              <a:rPr lang="en-US" altLang="zh-TW" dirty="0" smtClean="0"/>
+              <a:t>Language Model Based Prediction</a:t>
+            </a:r>
+            <a:endParaRPr lang="zh-TW" altLang="en-US" dirty="0"/>
+          </a:p>
+        </p:txBody>
+      </p:sp>
+      <p:sp>
+        <p:nvSpPr>
+          <p:cNvPr id="3" name="內容版面配置區 2"/>
+          <p:cNvSpPr>
+            <a:spLocks noGrp="1"/>
+          </p:cNvSpPr>
+          <p:nvPr>
+            <p:ph idx="1"/>
+          </p:nvPr>
+        </p:nvSpPr>
+        <p:spPr/>
+        <p:txBody>
+          <a:bodyPr/>
+          <a:lstStyle/>
+          <a:p>
+            <a:r>
+              <a:rPr lang="en-US" altLang="zh-TW" dirty="0" smtClean="0">
+                <a:latin typeface="微軟正黑體" panose="020B0604030504040204" pitchFamily="34" charset="-120"/>
+                <a:ea typeface="微軟正黑體" panose="020B0604030504040204" pitchFamily="34" charset="-120"/>
+              </a:rPr>
+              <a:t>LM</a:t>
+            </a:r>
+            <a:r>
+              <a:rPr lang="zh-TW" altLang="en-US" dirty="0" smtClean="0">
+                <a:latin typeface="微軟正黑體" panose="020B0604030504040204" pitchFamily="34" charset="-120"/>
+                <a:ea typeface="微軟正黑體" panose="020B0604030504040204" pitchFamily="34" charset="-120"/>
+              </a:rPr>
+              <a:t>的出現，主要是在於認為語言學的資訊可以透過神經網絡的學習透過數值表達出</a:t>
+            </a:r>
+            <a:endParaRPr lang="en-US" altLang="zh-TW" dirty="0" smtClean="0">
+              <a:latin typeface="微軟正黑體" panose="020B0604030504040204" pitchFamily="34" charset="-120"/>
+              <a:ea typeface="微軟正黑體" panose="020B0604030504040204" pitchFamily="34" charset="-120"/>
+            </a:endParaRPr>
+          </a:p>
+          <a:p>
+            <a:endParaRPr lang="en-US" altLang="zh-TW" dirty="0">
+              <a:latin typeface="微軟正黑體" panose="020B0604030504040204" pitchFamily="34" charset="-120"/>
+              <a:ea typeface="微軟正黑體" panose="020B0604030504040204" pitchFamily="34" charset="-120"/>
+            </a:endParaRPr>
+          </a:p>
+          <a:p>
+            <a:r>
+              <a:rPr lang="zh-TW" altLang="en-US" dirty="0" smtClean="0">
+                <a:latin typeface="微軟正黑體" panose="020B0604030504040204" pitchFamily="34" charset="-120"/>
+                <a:ea typeface="微軟正黑體" panose="020B0604030504040204" pitchFamily="34" charset="-120"/>
+              </a:rPr>
+              <a:t>透過預訓練的語言模型，所輸</a:t>
+            </a:r>
+            <a:endParaRPr lang="en-US" altLang="zh-TW" dirty="0" smtClean="0">
+              <a:latin typeface="微軟正黑體" panose="020B0604030504040204" pitchFamily="34" charset="-120"/>
+              <a:ea typeface="微軟正黑體" panose="020B0604030504040204" pitchFamily="34" charset="-120"/>
+            </a:endParaRPr>
+          </a:p>
+          <a:p>
+            <a:pPr marL="0" indent="0">
+              <a:buNone/>
+            </a:pPr>
+            <a:r>
+              <a:rPr lang="zh-TW" altLang="en-US" dirty="0" smtClean="0">
+                <a:latin typeface="微軟正黑體" panose="020B0604030504040204" pitchFamily="34" charset="-120"/>
+                <a:ea typeface="微軟正黑體" panose="020B0604030504040204" pitchFamily="34" charset="-120"/>
+              </a:rPr>
+              <a:t>出的文字向量，可以作為後續任</a:t>
+            </a:r>
+            <a:endParaRPr lang="en-US" altLang="zh-TW" dirty="0" smtClean="0">
+              <a:latin typeface="微軟正黑體" panose="020B0604030504040204" pitchFamily="34" charset="-120"/>
+              <a:ea typeface="微軟正黑體" panose="020B0604030504040204" pitchFamily="34" charset="-120"/>
+            </a:endParaRPr>
+          </a:p>
+          <a:p>
+            <a:pPr marL="0" indent="0">
+              <a:buNone/>
+            </a:pPr>
+            <a:r>
+              <a:rPr lang="zh-TW" altLang="en-US" dirty="0" smtClean="0">
+                <a:latin typeface="微軟正黑體" panose="020B0604030504040204" pitchFamily="34" charset="-120"/>
+                <a:ea typeface="微軟正黑體" panose="020B0604030504040204" pitchFamily="34" charset="-120"/>
+              </a:rPr>
+              <a:t>何ＮＬＰ任務的基礎</a:t>
+            </a:r>
+            <a:endParaRPr lang="en-US" altLang="zh-TW" dirty="0" smtClean="0">
+              <a:latin typeface="微軟正黑體" panose="020B0604030504040204" pitchFamily="34" charset="-120"/>
+              <a:ea typeface="微軟正黑體" panose="020B0604030504040204" pitchFamily="34" charset="-120"/>
+            </a:endParaRPr>
+          </a:p>
+        </p:txBody>
+      </p:sp>
+      <p:pic>
+        <p:nvPicPr>
+          <p:cNvPr id="6146" name="Picture 2" descr="LM.2 What is a language model? - YouTube"/>
+          <p:cNvPicPr>
+            <a:picLocks noChangeAspect="1" noChangeArrowheads="1"/>
+          </p:cNvPicPr>
+          <p:nvPr/>
+        </p:nvPicPr>
+        <p:blipFill>
+          <a:blip r:embed="rId2">
+            <a:extLst>
+              <a:ext uri="{28A0092B-C50C-407E-A947-70E740481C1C}">
+                <a14:useLocalDpi xmlns:a14="http://schemas.microsoft.com/office/drawing/2010/main" val="0"/>
+              </a:ext>
+            </a:extLst>
+          </a:blip>
+          <a:srcRect/>
+          <a:stretch>
+            <a:fillRect/>
+          </a:stretch>
+        </p:blipFill>
+        <p:spPr bwMode="auto">
+          <a:xfrm>
+            <a:off x="7171836" y="3036556"/>
+            <a:ext cx="4911968" cy="3683977"/>
+          </a:xfrm>
+          <a:prstGeom prst="rect">
+            <a:avLst/>
+          </a:prstGeom>
+          <a:noFill/>
+          <a:extLst>
+            <a:ext uri="{909E8E84-426E-40DD-AFC4-6F175D3DCCD1}">
+              <a14:hiddenFill xmlns:a14="http://schemas.microsoft.com/office/drawing/2010/main">
+                <a:solidFill>
+                  <a:srgbClr val="FFFFFF"/>
+                </a:solidFill>
+              </a14:hiddenFill>
+            </a:ext>
+          </a:extLst>
+        </p:spPr>
+      </p:pic>
+      <p:pic>
+        <p:nvPicPr>
+          <p:cNvPr id="6150" name="Picture 6" descr="Google AI Blog: Open Sourcing BERT: State-of-the-Art Pre-training ..."/>
+          <p:cNvPicPr>
+            <a:picLocks noChangeAspect="1" noChangeArrowheads="1"/>
+          </p:cNvPicPr>
+          <p:nvPr/>
+        </p:nvPicPr>
+        <p:blipFill>
+          <a:blip r:embed="rId3">
+            <a:extLst>
+              <a:ext uri="{28A0092B-C50C-407E-A947-70E740481C1C}">
+                <a14:useLocalDpi xmlns:a14="http://schemas.microsoft.com/office/drawing/2010/main" val="0"/>
+              </a:ext>
+            </a:extLst>
+          </a:blip>
+          <a:srcRect/>
+          <a:stretch>
+            <a:fillRect/>
+          </a:stretch>
+        </p:blipFill>
+        <p:spPr bwMode="auto">
+          <a:xfrm>
+            <a:off x="116988" y="5016011"/>
+            <a:ext cx="7356848" cy="1704522"/>
+          </a:xfrm>
+          <a:prstGeom prst="rect">
+            <a:avLst/>
+          </a:prstGeom>
+          <a:noFill/>
+          <a:extLst>
+            <a:ext uri="{909E8E84-426E-40DD-AFC4-6F175D3DCCD1}">
+              <a14:hiddenFill xmlns:a14="http://schemas.microsoft.com/office/drawing/2010/main">
+                <a:solidFill>
+                  <a:srgbClr val="FFFFFF"/>
+                </a:solidFill>
+              </a14:hiddenFill>
+            </a:ext>
+          </a:extLst>
+        </p:spPr>
+      </p:pic>
+    </p:spTree>
+    <p:extLst>
+      <p:ext uri="{BB962C8B-B14F-4D97-AF65-F5344CB8AC3E}">
+        <p14:creationId xmlns:p14="http://schemas.microsoft.com/office/powerpoint/2010/main" val="3683000370"/>
+      </p:ext>
+    </p:extLst>
+  </p:cSld>
+  <p:clrMapOvr>
+    <a:masterClrMapping/>
+  </p:clrMapOvr>
+  <p:timing>
+    <p:tnLst>
+      <p:par>
+        <p:cTn id="1" dur="indefinite" restart="never" nodeType="tmRoot"/>
+      </p:par>
+    </p:tnLst>
+  </p:timing>
+</p:sld>
+</file>
+
+<file path=ppt/slides/slide36.xml><?xml version="1.0" encoding="utf-8"?>
+<p:sld xmlns:a="http://schemas.openxmlformats.org/drawingml/2006/main" xmlns:r="http://schemas.openxmlformats.org/officeDocument/2006/relationships" xmlns:p="http://schemas.openxmlformats.org/presentationml/2006/main">
+  <p:cSld>
+    <p:spTree>
+      <p:nvGrpSpPr>
+        <p:cNvPr id="1" name=""/>
+        <p:cNvGrpSpPr/>
+        <p:nvPr/>
+      </p:nvGrpSpPr>
+      <p:grpSpPr>
+        <a:xfrm>
+          <a:off x="0" y="0"/>
+          <a:ext cx="0" cy="0"/>
+          <a:chOff x="0" y="0"/>
+          <a:chExt cx="0" cy="0"/>
+        </a:xfrm>
+      </p:grpSpPr>
+      <p:sp>
+        <p:nvSpPr>
+          <p:cNvPr id="2" name="標題 1"/>
+          <p:cNvSpPr>
+            <a:spLocks noGrp="1"/>
+          </p:cNvSpPr>
+          <p:nvPr>
+            <p:ph type="title"/>
+          </p:nvPr>
+        </p:nvSpPr>
+        <p:spPr/>
+        <p:txBody>
+          <a:bodyPr/>
+          <a:lstStyle/>
+          <a:p>
+            <a:r>
+              <a:rPr lang="en-US" altLang="zh-TW" dirty="0" smtClean="0"/>
+              <a:t>GPT2</a:t>
+            </a:r>
+            <a:endParaRPr lang="zh-TW" altLang="en-US" dirty="0"/>
+          </a:p>
+        </p:txBody>
+      </p:sp>
+      <p:sp>
+        <p:nvSpPr>
+          <p:cNvPr id="3" name="內容版面配置區 2"/>
+          <p:cNvSpPr>
+            <a:spLocks noGrp="1"/>
+          </p:cNvSpPr>
+          <p:nvPr>
+            <p:ph idx="1"/>
+          </p:nvPr>
+        </p:nvSpPr>
+        <p:spPr/>
+        <p:txBody>
+          <a:bodyPr/>
+          <a:lstStyle/>
+          <a:p>
+            <a:endParaRPr lang="zh-TW" altLang="en-US"/>
+          </a:p>
+        </p:txBody>
+      </p:sp>
+      <p:pic>
+        <p:nvPicPr>
+          <p:cNvPr id="4" name="圖片 3"/>
+          <p:cNvPicPr>
+            <a:picLocks noChangeAspect="1"/>
+          </p:cNvPicPr>
+          <p:nvPr/>
+        </p:nvPicPr>
+        <p:blipFill>
+          <a:blip r:embed="rId2"/>
+          <a:stretch>
+            <a:fillRect/>
+          </a:stretch>
+        </p:blipFill>
+        <p:spPr>
+          <a:xfrm>
+            <a:off x="7560391" y="2495918"/>
+            <a:ext cx="4631609" cy="4362082"/>
+          </a:xfrm>
+          <a:prstGeom prst="rect">
+            <a:avLst/>
+          </a:prstGeom>
+        </p:spPr>
+      </p:pic>
+      <p:pic>
+        <p:nvPicPr>
+          <p:cNvPr id="4104" name="Picture 8" descr="GPT及GPT-2论文笔记– 蓝林鸟的博客"/>
+          <p:cNvPicPr>
+            <a:picLocks noChangeAspect="1" noChangeArrowheads="1"/>
+          </p:cNvPicPr>
+          <p:nvPr/>
+        </p:nvPicPr>
+        <p:blipFill>
+          <a:blip r:embed="rId3">
+            <a:extLst>
+              <a:ext uri="{28A0092B-C50C-407E-A947-70E740481C1C}">
+                <a14:useLocalDpi xmlns:a14="http://schemas.microsoft.com/office/drawing/2010/main" val="0"/>
+              </a:ext>
+            </a:extLst>
+          </a:blip>
+          <a:srcRect/>
+          <a:stretch>
+            <a:fillRect/>
+          </a:stretch>
+        </p:blipFill>
+        <p:spPr bwMode="auto">
+          <a:xfrm>
+            <a:off x="298897" y="2989385"/>
+            <a:ext cx="7261494" cy="3717559"/>
+          </a:xfrm>
+          <a:prstGeom prst="rect">
+            <a:avLst/>
+          </a:prstGeom>
+          <a:noFill/>
+          <a:extLst>
+            <a:ext uri="{909E8E84-426E-40DD-AFC4-6F175D3DCCD1}">
+              <a14:hiddenFill xmlns:a14="http://schemas.microsoft.com/office/drawing/2010/main">
+                <a:solidFill>
+                  <a:srgbClr val="FFFFFF"/>
+                </a:solidFill>
+              </a14:hiddenFill>
+            </a:ext>
+          </a:extLst>
+        </p:spPr>
+      </p:pic>
+    </p:spTree>
+    <p:extLst>
+      <p:ext uri="{BB962C8B-B14F-4D97-AF65-F5344CB8AC3E}">
+        <p14:creationId xmlns:p14="http://schemas.microsoft.com/office/powerpoint/2010/main" val="155559941"/>
+      </p:ext>
+    </p:extLst>
+  </p:cSld>
+  <p:clrMapOvr>
+    <a:masterClrMapping/>
+  </p:clrMapOvr>
+  <p:timing>
+    <p:tnLst>
+      <p:par>
+        <p:cTn id="1" dur="indefinite" restart="never" nodeType="tmRoot"/>
+      </p:par>
+    </p:tnLst>
+  </p:timing>
+</p:sld>
+</file>
+
+<file path=ppt/slides/slide37.xml><?xml version="1.0" encoding="utf-8"?>
+<p:sld xmlns:a="http://schemas.openxmlformats.org/drawingml/2006/main" xmlns:r="http://schemas.openxmlformats.org/officeDocument/2006/relationships" xmlns:p="http://schemas.openxmlformats.org/presentationml/2006/main">
+  <p:cSld>
+    <p:spTree>
+      <p:nvGrpSpPr>
+        <p:cNvPr id="1" name=""/>
+        <p:cNvGrpSpPr/>
+        <p:nvPr/>
+      </p:nvGrpSpPr>
+      <p:grpSpPr>
+        <a:xfrm>
+          <a:off x="0" y="0"/>
+          <a:ext cx="0" cy="0"/>
+          <a:chOff x="0" y="0"/>
+          <a:chExt cx="0" cy="0"/>
+        </a:xfrm>
+      </p:grpSpPr>
+      <p:sp>
+        <p:nvSpPr>
+          <p:cNvPr id="2" name="標題 1"/>
+          <p:cNvSpPr>
+            <a:spLocks noGrp="1"/>
+          </p:cNvSpPr>
+          <p:nvPr>
+            <p:ph type="title"/>
+          </p:nvPr>
+        </p:nvSpPr>
+        <p:spPr/>
+        <p:txBody>
+          <a:bodyPr/>
+          <a:lstStyle/>
+          <a:p>
+            <a:r>
+              <a:rPr lang="en-US" altLang="zh-TW" dirty="0" smtClean="0"/>
               <a:t>BERT</a:t>
             </a:r>
             <a:endParaRPr lang="zh-TW" altLang="en-US" dirty="0"/>
@@ -11427,7 +12119,7 @@
 </p:sld>
 </file>
 
-<file path=ppt/slides/slide35.xml><?xml version="1.0" encoding="utf-8"?>
+<file path=ppt/slides/slide38.xml><?xml version="1.0" encoding="utf-8"?>
 <p:sld xmlns:a="http://schemas.openxmlformats.org/drawingml/2006/main" xmlns:r="http://schemas.openxmlformats.org/officeDocument/2006/relationships" xmlns:p="http://schemas.openxmlformats.org/presentationml/2006/main">
   <p:cSld>
     <p:spTree>

</xml_diff>